<commit_message>
Estado del trabajo final
</commit_message>
<xml_diff>
--- a/Predicción de aprobación de tarjeta de crédito.pptx
+++ b/Predicción de aprobación de tarjeta de crédito.pptx
@@ -11,7 +11,8 @@
     <p:sldId id="260" r:id="rId5"/>
     <p:sldId id="259" r:id="rId6"/>
     <p:sldId id="261" r:id="rId7"/>
-    <p:sldId id="262" r:id="rId8"/>
+    <p:sldId id="263" r:id="rId8"/>
+    <p:sldId id="262" r:id="rId9"/>
   </p:sldIdLst>
   <p:sldSz cx="12192000" cy="6858000"/>
   <p:notesSz cx="6858000" cy="9144000"/>
@@ -267,7 +268,7 @@
           <a:p>
             <a:fld id="{D38A885E-2CA2-4AF7-99FC-BD74A4D8A12C}" type="datetimeFigureOut">
               <a:rPr lang="es-AR" smtClean="0"/>
-              <a:t>14/3/2024</a:t>
+              <a:t>20/5/2024</a:t>
             </a:fld>
             <a:endParaRPr lang="es-AR"/>
           </a:p>
@@ -467,7 +468,7 @@
           <a:p>
             <a:fld id="{D38A885E-2CA2-4AF7-99FC-BD74A4D8A12C}" type="datetimeFigureOut">
               <a:rPr lang="es-AR" smtClean="0"/>
-              <a:t>14/3/2024</a:t>
+              <a:t>20/5/2024</a:t>
             </a:fld>
             <a:endParaRPr lang="es-AR"/>
           </a:p>
@@ -677,7 +678,7 @@
           <a:p>
             <a:fld id="{D38A885E-2CA2-4AF7-99FC-BD74A4D8A12C}" type="datetimeFigureOut">
               <a:rPr lang="es-AR" smtClean="0"/>
-              <a:t>14/3/2024</a:t>
+              <a:t>20/5/2024</a:t>
             </a:fld>
             <a:endParaRPr lang="es-AR"/>
           </a:p>
@@ -877,7 +878,7 @@
           <a:p>
             <a:fld id="{D38A885E-2CA2-4AF7-99FC-BD74A4D8A12C}" type="datetimeFigureOut">
               <a:rPr lang="es-AR" smtClean="0"/>
-              <a:t>14/3/2024</a:t>
+              <a:t>20/5/2024</a:t>
             </a:fld>
             <a:endParaRPr lang="es-AR"/>
           </a:p>
@@ -1153,7 +1154,7 @@
           <a:p>
             <a:fld id="{D38A885E-2CA2-4AF7-99FC-BD74A4D8A12C}" type="datetimeFigureOut">
               <a:rPr lang="es-AR" smtClean="0"/>
-              <a:t>14/3/2024</a:t>
+              <a:t>20/5/2024</a:t>
             </a:fld>
             <a:endParaRPr lang="es-AR"/>
           </a:p>
@@ -1421,7 +1422,7 @@
           <a:p>
             <a:fld id="{D38A885E-2CA2-4AF7-99FC-BD74A4D8A12C}" type="datetimeFigureOut">
               <a:rPr lang="es-AR" smtClean="0"/>
-              <a:t>14/3/2024</a:t>
+              <a:t>20/5/2024</a:t>
             </a:fld>
             <a:endParaRPr lang="es-AR"/>
           </a:p>
@@ -1836,7 +1837,7 @@
           <a:p>
             <a:fld id="{D38A885E-2CA2-4AF7-99FC-BD74A4D8A12C}" type="datetimeFigureOut">
               <a:rPr lang="es-AR" smtClean="0"/>
-              <a:t>14/3/2024</a:t>
+              <a:t>20/5/2024</a:t>
             </a:fld>
             <a:endParaRPr lang="es-AR"/>
           </a:p>
@@ -1978,7 +1979,7 @@
           <a:p>
             <a:fld id="{D38A885E-2CA2-4AF7-99FC-BD74A4D8A12C}" type="datetimeFigureOut">
               <a:rPr lang="es-AR" smtClean="0"/>
-              <a:t>14/3/2024</a:t>
+              <a:t>20/5/2024</a:t>
             </a:fld>
             <a:endParaRPr lang="es-AR"/>
           </a:p>
@@ -2091,7 +2092,7 @@
           <a:p>
             <a:fld id="{D38A885E-2CA2-4AF7-99FC-BD74A4D8A12C}" type="datetimeFigureOut">
               <a:rPr lang="es-AR" smtClean="0"/>
-              <a:t>14/3/2024</a:t>
+              <a:t>20/5/2024</a:t>
             </a:fld>
             <a:endParaRPr lang="es-AR"/>
           </a:p>
@@ -2404,7 +2405,7 @@
           <a:p>
             <a:fld id="{D38A885E-2CA2-4AF7-99FC-BD74A4D8A12C}" type="datetimeFigureOut">
               <a:rPr lang="es-AR" smtClean="0"/>
-              <a:t>14/3/2024</a:t>
+              <a:t>20/5/2024</a:t>
             </a:fld>
             <a:endParaRPr lang="es-AR"/>
           </a:p>
@@ -2693,7 +2694,7 @@
           <a:p>
             <a:fld id="{D38A885E-2CA2-4AF7-99FC-BD74A4D8A12C}" type="datetimeFigureOut">
               <a:rPr lang="es-AR" smtClean="0"/>
-              <a:t>14/3/2024</a:t>
+              <a:t>20/5/2024</a:t>
             </a:fld>
             <a:endParaRPr lang="es-AR"/>
           </a:p>
@@ -2936,7 +2937,7 @@
           <a:p>
             <a:fld id="{D38A885E-2CA2-4AF7-99FC-BD74A4D8A12C}" type="datetimeFigureOut">
               <a:rPr lang="es-AR" smtClean="0"/>
-              <a:t>14/3/2024</a:t>
+              <a:t>20/5/2024</a:t>
             </a:fld>
             <a:endParaRPr lang="es-AR"/>
           </a:p>
@@ -3863,6 +3864,44 @@
           </a:p>
         </p:txBody>
       </p:sp>
+      <p:sp>
+        <p:nvSpPr>
+          <p:cNvPr id="9" name="CuadroTexto 8">
+            <a:extLst>
+              <a:ext uri="{FF2B5EF4-FFF2-40B4-BE49-F238E27FC236}">
+                <a16:creationId xmlns:a16="http://schemas.microsoft.com/office/drawing/2014/main" id="{82C07C7B-B6E3-4626-B521-C17C83728868}"/>
+              </a:ext>
+            </a:extLst>
+          </p:cNvPr>
+          <p:cNvSpPr txBox="1"/>
+          <p:nvPr/>
+        </p:nvSpPr>
+        <p:spPr>
+          <a:xfrm>
+            <a:off x="1142999" y="5789083"/>
+            <a:ext cx="8932334" cy="369332"/>
+          </a:xfrm>
+          <a:prstGeom prst="rect">
+            <a:avLst/>
+          </a:prstGeom>
+          <a:noFill/>
+        </p:spPr>
+        <p:txBody>
+          <a:bodyPr wrap="square" rtlCol="0">
+            <a:spAutoFit/>
+          </a:bodyPr>
+          <a:lstStyle/>
+          <a:p>
+            <a:pPr algn="ctr"/>
+            <a:r>
+              <a:rPr lang="es-AR" dirty="0">
+                <a:latin typeface="Monaspace Argon" pitchFamily="50" charset="0"/>
+              </a:rPr>
+              <a:t>- Modelos</a:t>
+            </a:r>
+          </a:p>
+        </p:txBody>
+      </p:sp>
     </p:spTree>
     <p:extLst>
       <p:ext uri="{BB962C8B-B14F-4D97-AF65-F5344CB8AC3E}">
@@ -4699,6 +4738,295 @@
           <p:cNvPr id="4" name="CuadroTexto 3">
             <a:extLst>
               <a:ext uri="{FF2B5EF4-FFF2-40B4-BE49-F238E27FC236}">
+                <a16:creationId xmlns:a16="http://schemas.microsoft.com/office/drawing/2014/main" id="{4AB0C1A7-E38F-4D52-B0E4-8462EC88E198}"/>
+              </a:ext>
+            </a:extLst>
+          </p:cNvPr>
+          <p:cNvSpPr txBox="1"/>
+          <p:nvPr/>
+        </p:nvSpPr>
+        <p:spPr>
+          <a:xfrm>
+            <a:off x="1629833" y="618640"/>
+            <a:ext cx="8932334" cy="523220"/>
+          </a:xfrm>
+          <a:prstGeom prst="rect">
+            <a:avLst/>
+          </a:prstGeom>
+          <a:noFill/>
+        </p:spPr>
+        <p:txBody>
+          <a:bodyPr wrap="square" rtlCol="0">
+            <a:spAutoFit/>
+          </a:bodyPr>
+          <a:lstStyle/>
+          <a:p>
+            <a:pPr algn="ctr"/>
+            <a:r>
+              <a:rPr lang="es-AR" sz="2800" dirty="0">
+                <a:latin typeface="Monaspace Argon" pitchFamily="50" charset="0"/>
+              </a:rPr>
+              <a:t>Modelos</a:t>
+            </a:r>
+          </a:p>
+        </p:txBody>
+      </p:sp>
+      <p:sp>
+        <p:nvSpPr>
+          <p:cNvPr id="7" name="CuadroTexto 6">
+            <a:extLst>
+              <a:ext uri="{FF2B5EF4-FFF2-40B4-BE49-F238E27FC236}">
+                <a16:creationId xmlns:a16="http://schemas.microsoft.com/office/drawing/2014/main" id="{3ACDD080-F2AB-4FF8-B40C-2FE616F05A4B}"/>
+              </a:ext>
+            </a:extLst>
+          </p:cNvPr>
+          <p:cNvSpPr txBox="1"/>
+          <p:nvPr/>
+        </p:nvSpPr>
+        <p:spPr>
+          <a:xfrm>
+            <a:off x="1299633" y="2024138"/>
+            <a:ext cx="9592733" cy="3693319"/>
+          </a:xfrm>
+          <a:prstGeom prst="rect">
+            <a:avLst/>
+          </a:prstGeom>
+          <a:noFill/>
+        </p:spPr>
+        <p:txBody>
+          <a:bodyPr wrap="square" rtlCol="0">
+            <a:spAutoFit/>
+          </a:bodyPr>
+          <a:lstStyle/>
+          <a:p>
+            <a:pPr algn="ctr"/>
+            <a:r>
+              <a:rPr lang="es-AR" dirty="0">
+                <a:latin typeface="Monospace Neon"/>
+              </a:rPr>
+              <a:t>Se probo usando lo siguientes modelos:</a:t>
+            </a:r>
+          </a:p>
+          <a:p>
+            <a:pPr algn="l"/>
+            <a:endParaRPr lang="es-AR" dirty="0">
+              <a:latin typeface="Monospace Neon"/>
+            </a:endParaRPr>
+          </a:p>
+          <a:p>
+            <a:pPr algn="l"/>
+            <a:r>
+              <a:rPr lang="es-AR" b="1" u="sng" dirty="0" err="1">
+                <a:latin typeface="Monospace Neon"/>
+              </a:rPr>
+              <a:t>Random</a:t>
+            </a:r>
+            <a:r>
+              <a:rPr lang="es-AR" b="1" u="sng" dirty="0">
+                <a:latin typeface="Monospace Neon"/>
+              </a:rPr>
+              <a:t> Forest </a:t>
+            </a:r>
+            <a:r>
+              <a:rPr lang="es-AR" b="1" u="sng" dirty="0" err="1">
+                <a:latin typeface="Monospace Neon"/>
+              </a:rPr>
+              <a:t>Classifier</a:t>
+            </a:r>
+            <a:r>
+              <a:rPr lang="es-AR" b="1" u="sng" dirty="0">
+                <a:latin typeface="Monospace Neon"/>
+              </a:rPr>
+              <a:t>: </a:t>
+            </a:r>
+          </a:p>
+          <a:p>
+            <a:pPr algn="l"/>
+            <a:r>
+              <a:rPr lang="es-AR" dirty="0">
+                <a:latin typeface="Monospace Neon"/>
+              </a:rPr>
+              <a:t>En este modelo se utilizo PCA lo cual no brindo muy buenos resultados debido al desbalance de clases, </a:t>
+            </a:r>
+            <a:r>
+              <a:rPr lang="es-AR" dirty="0" err="1">
+                <a:latin typeface="Monospace Neon"/>
+              </a:rPr>
+              <a:t>asi</a:t>
+            </a:r>
+            <a:r>
+              <a:rPr lang="es-AR" dirty="0">
+                <a:latin typeface="Monospace Neon"/>
+              </a:rPr>
+              <a:t> que se utilizo SMOTE para balancear las clases y dio muy buenos resultados</a:t>
+            </a:r>
+          </a:p>
+          <a:p>
+            <a:pPr algn="l"/>
+            <a:r>
+              <a:rPr lang="es-AR" b="1" u="sng" dirty="0" err="1">
+                <a:latin typeface="Monospace Neon"/>
+              </a:rPr>
+              <a:t>Logistic</a:t>
+            </a:r>
+            <a:r>
+              <a:rPr lang="es-AR" b="1" u="sng" dirty="0">
+                <a:latin typeface="Monospace Neon"/>
+              </a:rPr>
+              <a:t> </a:t>
+            </a:r>
+            <a:r>
+              <a:rPr lang="es-AR" b="1" u="sng" dirty="0" err="1">
+                <a:latin typeface="Monospace Neon"/>
+              </a:rPr>
+              <a:t>Regression</a:t>
+            </a:r>
+            <a:r>
+              <a:rPr lang="es-AR" b="1" u="sng" dirty="0">
+                <a:latin typeface="Monospace Neon"/>
+              </a:rPr>
+              <a:t>:</a:t>
+            </a:r>
+          </a:p>
+          <a:p>
+            <a:pPr algn="l"/>
+            <a:r>
+              <a:rPr lang="es-AR" dirty="0">
+                <a:latin typeface="Monospace Neon"/>
+              </a:rPr>
+              <a:t>Este modelo sufre de </a:t>
+            </a:r>
+            <a:r>
+              <a:rPr lang="es-AR" dirty="0" err="1">
+                <a:latin typeface="Monospace Neon"/>
+              </a:rPr>
+              <a:t>overfitting</a:t>
+            </a:r>
+            <a:r>
+              <a:rPr lang="es-AR" dirty="0">
+                <a:latin typeface="Monospace Neon"/>
+              </a:rPr>
+              <a:t> debido al desbalance de las clases, también se utilizo SMOTE pero los resultados son muy regulares</a:t>
+            </a:r>
+          </a:p>
+          <a:p>
+            <a:pPr algn="l"/>
+            <a:r>
+              <a:rPr lang="es-AR" b="1" u="sng" dirty="0" err="1">
+                <a:latin typeface="Monospace Neon"/>
+              </a:rPr>
+              <a:t>Decision</a:t>
+            </a:r>
+            <a:r>
+              <a:rPr lang="es-AR" b="1" u="sng" dirty="0">
+                <a:latin typeface="Monospace Neon"/>
+              </a:rPr>
+              <a:t> </a:t>
+            </a:r>
+            <a:r>
+              <a:rPr lang="es-AR" b="1" u="sng" dirty="0" err="1">
+                <a:latin typeface="Monospace Neon"/>
+              </a:rPr>
+              <a:t>Tree</a:t>
+            </a:r>
+            <a:r>
+              <a:rPr lang="es-AR" b="1" u="sng" dirty="0">
+                <a:latin typeface="Monospace Neon"/>
+              </a:rPr>
+              <a:t> </a:t>
+            </a:r>
+            <a:r>
+              <a:rPr lang="es-AR" b="1" u="sng" dirty="0" err="1">
+                <a:latin typeface="Monospace Neon"/>
+              </a:rPr>
+              <a:t>Classifier</a:t>
+            </a:r>
+            <a:r>
+              <a:rPr lang="es-AR" b="1" u="sng" dirty="0">
+                <a:latin typeface="Monospace Neon"/>
+              </a:rPr>
+              <a:t>:</a:t>
+            </a:r>
+          </a:p>
+          <a:p>
+            <a:pPr algn="l"/>
+            <a:r>
+              <a:rPr lang="es-AR" dirty="0">
+                <a:latin typeface="Monospace Neon"/>
+              </a:rPr>
+              <a:t>Este modelo como tal brinda resultados muy similares al modelo de </a:t>
+            </a:r>
+            <a:r>
+              <a:rPr lang="es-AR" dirty="0" err="1">
+                <a:latin typeface="Monospace Neon"/>
+              </a:rPr>
+              <a:t>Random</a:t>
+            </a:r>
+            <a:r>
+              <a:rPr lang="es-AR" dirty="0">
+                <a:latin typeface="Monospace Neon"/>
+              </a:rPr>
+              <a:t> Forest </a:t>
+            </a:r>
+            <a:r>
+              <a:rPr lang="es-AR" dirty="0" err="1">
+                <a:latin typeface="Monospace Neon"/>
+              </a:rPr>
+              <a:t>Classifier</a:t>
+            </a:r>
+            <a:r>
+              <a:rPr lang="es-AR" dirty="0">
+                <a:latin typeface="Monospace Neon"/>
+              </a:rPr>
+              <a:t>, clasifica bien la clase 0 (elegible), le cuesta clasificar en la clase 1 (no elegible), usando SMOTE se soluciona lo de la clase 1 gracias a que balancea los datos</a:t>
+            </a:r>
+          </a:p>
+          <a:p>
+            <a:pPr marL="285750" indent="-285750" algn="l">
+              <a:buFontTx/>
+              <a:buChar char="-"/>
+            </a:pPr>
+            <a:endParaRPr lang="es-AR" dirty="0">
+              <a:latin typeface="Monospace Neon"/>
+            </a:endParaRPr>
+          </a:p>
+        </p:txBody>
+      </p:sp>
+    </p:spTree>
+    <p:extLst>
+      <p:ext uri="{BB962C8B-B14F-4D97-AF65-F5344CB8AC3E}">
+        <p14:creationId xmlns:p14="http://schemas.microsoft.com/office/powerpoint/2010/main" val="4163777958"/>
+      </p:ext>
+    </p:extLst>
+  </p:cSld>
+  <p:clrMapOvr>
+    <a:masterClrMapping/>
+  </p:clrMapOvr>
+</p:sld>
+</file>
+
+<file path=ppt/slides/slide8.xml><?xml version="1.0" encoding="utf-8"?>
+<p:sld xmlns:a="http://schemas.openxmlformats.org/drawingml/2006/main" xmlns:r="http://schemas.openxmlformats.org/officeDocument/2006/relationships" xmlns:p="http://schemas.openxmlformats.org/presentationml/2006/main">
+  <p:cSld>
+    <p:spTree>
+      <p:nvGrpSpPr>
+        <p:cNvPr id="1" name=""/>
+        <p:cNvGrpSpPr/>
+        <p:nvPr/>
+      </p:nvGrpSpPr>
+      <p:grpSpPr>
+        <a:xfrm>
+          <a:off x="0" y="0"/>
+          <a:ext cx="0" cy="0"/>
+          <a:chOff x="0" y="0"/>
+          <a:chExt cx="0" cy="0"/>
+        </a:xfrm>
+      </p:grpSpPr>
+      <p:sp>
+        <p:nvSpPr>
+          <p:cNvPr id="4" name="CuadroTexto 3">
+            <a:extLst>
+              <a:ext uri="{FF2B5EF4-FFF2-40B4-BE49-F238E27FC236}">
                 <a16:creationId xmlns:a16="http://schemas.microsoft.com/office/drawing/2014/main" id="{525B72D9-001B-A77D-1620-B83088A97685}"/>
               </a:ext>
             </a:extLst>
@@ -4750,7 +5078,7 @@
         <p:spPr>
           <a:xfrm>
             <a:off x="894347" y="1620253"/>
-            <a:ext cx="10291011" cy="3970318"/>
+            <a:ext cx="10291011" cy="4616648"/>
           </a:xfrm>
           <a:prstGeom prst="rect">
             <a:avLst/>
@@ -4832,9 +5160,55 @@
               </a:rPr>
               <a:t>Se observa una variabilidad en la distribución de ingresos, con un rango predominante alrededor de 200.000. Además, los clientes con teléfonos de trabajo parecen tener una mayor estabilidad financiera. Esto podría sugerir la importancia de explorar la relación entre el tipo de empleo y la situación financiera del cliente para diseñar estrategias de servicio más efectivas.</a:t>
             </a:r>
-            <a:endParaRPr lang="es-AR" sz="1400" dirty="0">
+          </a:p>
+          <a:p>
+            <a:endParaRPr lang="es-ES" sz="1400" dirty="0">
               <a:latin typeface="Monaspace Neon" pitchFamily="50" charset="0"/>
             </a:endParaRPr>
+          </a:p>
+          <a:p>
+            <a:r>
+              <a:rPr lang="es-ES" sz="1400" b="1" dirty="0">
+                <a:latin typeface="Monaspace Neon" pitchFamily="50" charset="0"/>
+              </a:rPr>
+              <a:t>Modelos:</a:t>
+            </a:r>
+            <a:r>
+              <a:rPr lang="es-ES" sz="1400" dirty="0">
+                <a:latin typeface="Monaspace Neon" pitchFamily="50" charset="0"/>
+              </a:rPr>
+              <a:t> </a:t>
+            </a:r>
+            <a:r>
+              <a:rPr lang="es-AR" sz="1400" dirty="0">
+                <a:latin typeface="Monaspace Neon" pitchFamily="50" charset="0"/>
+              </a:rPr>
+              <a:t>El modelo de </a:t>
+            </a:r>
+            <a:r>
+              <a:rPr lang="es-AR" sz="1400" dirty="0" err="1">
+                <a:latin typeface="Monaspace Neon" pitchFamily="50" charset="0"/>
+              </a:rPr>
+              <a:t>Random</a:t>
+            </a:r>
+            <a:r>
+              <a:rPr lang="es-AR" sz="1400" dirty="0">
+                <a:latin typeface="Monaspace Neon" pitchFamily="50" charset="0"/>
+              </a:rPr>
+              <a:t> Forest </a:t>
+            </a:r>
+            <a:r>
+              <a:rPr lang="es-AR" sz="1400" dirty="0" err="1">
+                <a:latin typeface="Monaspace Neon" pitchFamily="50" charset="0"/>
+              </a:rPr>
+              <a:t>Classifier</a:t>
+            </a:r>
+            <a:r>
+              <a:rPr lang="es-AR" sz="1400" dirty="0">
+                <a:latin typeface="Monaspace Neon" pitchFamily="50" charset="0"/>
+              </a:rPr>
+              <a:t> es el que mejores resultados otorgara, así que es el modelo elegido </a:t>
+            </a:r>
           </a:p>
         </p:txBody>
       </p:sp>

</xml_diff>